<commit_message>
initial version, plus corrections to diagram.pptx
</commit_message>
<xml_diff>
--- a/idioms/ttp/c2-ip-range/diagram.pptx
+++ b/idioms/ttp/c2-ip-range/diagram.pptx
@@ -288,7 +288,7 @@
           <a:p>
             <a:fld id="{13F24B86-36D2-4655-BE2F-98B661AC85E1}" type="datetimeFigureOut">
               <a:rPr lang="en-US" smtClean="0"/>
-              <a:t>3/24/2014</a:t>
+              <a:t>3/26/2014</a:t>
             </a:fld>
             <a:endParaRPr lang="en-US"/>
           </a:p>
@@ -458,7 +458,7 @@
           <a:p>
             <a:fld id="{13F24B86-36D2-4655-BE2F-98B661AC85E1}" type="datetimeFigureOut">
               <a:rPr lang="en-US" smtClean="0"/>
-              <a:t>3/24/2014</a:t>
+              <a:t>3/26/2014</a:t>
             </a:fld>
             <a:endParaRPr lang="en-US"/>
           </a:p>
@@ -638,7 +638,7 @@
           <a:p>
             <a:fld id="{13F24B86-36D2-4655-BE2F-98B661AC85E1}" type="datetimeFigureOut">
               <a:rPr lang="en-US" smtClean="0"/>
-              <a:t>3/24/2014</a:t>
+              <a:t>3/26/2014</a:t>
             </a:fld>
             <a:endParaRPr lang="en-US"/>
           </a:p>
@@ -808,7 +808,7 @@
           <a:p>
             <a:fld id="{13F24B86-36D2-4655-BE2F-98B661AC85E1}" type="datetimeFigureOut">
               <a:rPr lang="en-US" smtClean="0"/>
-              <a:t>3/24/2014</a:t>
+              <a:t>3/26/2014</a:t>
             </a:fld>
             <a:endParaRPr lang="en-US"/>
           </a:p>
@@ -1054,7 +1054,7 @@
           <a:p>
             <a:fld id="{13F24B86-36D2-4655-BE2F-98B661AC85E1}" type="datetimeFigureOut">
               <a:rPr lang="en-US" smtClean="0"/>
-              <a:t>3/24/2014</a:t>
+              <a:t>3/26/2014</a:t>
             </a:fld>
             <a:endParaRPr lang="en-US"/>
           </a:p>
@@ -1342,7 +1342,7 @@
           <a:p>
             <a:fld id="{13F24B86-36D2-4655-BE2F-98B661AC85E1}" type="datetimeFigureOut">
               <a:rPr lang="en-US" smtClean="0"/>
-              <a:t>3/24/2014</a:t>
+              <a:t>3/26/2014</a:t>
             </a:fld>
             <a:endParaRPr lang="en-US"/>
           </a:p>
@@ -1764,7 +1764,7 @@
           <a:p>
             <a:fld id="{13F24B86-36D2-4655-BE2F-98B661AC85E1}" type="datetimeFigureOut">
               <a:rPr lang="en-US" smtClean="0"/>
-              <a:t>3/24/2014</a:t>
+              <a:t>3/26/2014</a:t>
             </a:fld>
             <a:endParaRPr lang="en-US"/>
           </a:p>
@@ -1882,7 +1882,7 @@
           <a:p>
             <a:fld id="{13F24B86-36D2-4655-BE2F-98B661AC85E1}" type="datetimeFigureOut">
               <a:rPr lang="en-US" smtClean="0"/>
-              <a:t>3/24/2014</a:t>
+              <a:t>3/26/2014</a:t>
             </a:fld>
             <a:endParaRPr lang="en-US"/>
           </a:p>
@@ -1977,7 +1977,7 @@
           <a:p>
             <a:fld id="{13F24B86-36D2-4655-BE2F-98B661AC85E1}" type="datetimeFigureOut">
               <a:rPr lang="en-US" smtClean="0"/>
-              <a:t>3/24/2014</a:t>
+              <a:t>3/26/2014</a:t>
             </a:fld>
             <a:endParaRPr lang="en-US"/>
           </a:p>
@@ -2254,7 +2254,7 @@
           <a:p>
             <a:fld id="{13F24B86-36D2-4655-BE2F-98B661AC85E1}" type="datetimeFigureOut">
               <a:rPr lang="en-US" smtClean="0"/>
-              <a:t>3/24/2014</a:t>
+              <a:t>3/26/2014</a:t>
             </a:fld>
             <a:endParaRPr lang="en-US"/>
           </a:p>
@@ -2507,7 +2507,7 @@
           <a:p>
             <a:fld id="{13F24B86-36D2-4655-BE2F-98B661AC85E1}" type="datetimeFigureOut">
               <a:rPr lang="en-US" smtClean="0"/>
-              <a:t>3/24/2014</a:t>
+              <a:t>3/26/2014</a:t>
             </a:fld>
             <a:endParaRPr lang="en-US"/>
           </a:p>
@@ -2720,7 +2720,7 @@
           <a:p>
             <a:fld id="{13F24B86-36D2-4655-BE2F-98B661AC85E1}" type="datetimeFigureOut">
               <a:rPr lang="en-US" smtClean="0"/>
-              <a:t>3/24/2014</a:t>
+              <a:t>3/26/2014</a:t>
             </a:fld>
             <a:endParaRPr lang="en-US"/>
           </a:p>
@@ -3276,7 +3276,6 @@
                         <a:rPr lang="en-US" sz="1100" dirty="0" smtClean="0"/>
                         <a:t>example:ttp-dd955e08-16d0-6f08-5064-50d9e7a3104d</a:t>
                       </a:r>
-                      <a:endParaRPr lang="en-US" sz="1100" dirty="0" smtClean="0"/>
                     </a:p>
                   </a:txBody>
                   <a:tcPr>
@@ -3361,7 +3360,6 @@
                         <a:rPr lang="en-US" sz="1100" dirty="0" smtClean="0"/>
                         <a:t>Malware C2 Channel</a:t>
                       </a:r>
-                      <a:endParaRPr lang="en-US" sz="1100" dirty="0" smtClean="0"/>
                     </a:p>
                   </a:txBody>
                   <a:tcPr>
@@ -3522,11 +3520,7 @@
                     <a:p>
                       <a:r>
                         <a:rPr lang="en-US" sz="1100" dirty="0" smtClean="0"/>
-                        <a:t>    </a:t>
-                      </a:r>
-                      <a:r>
-                        <a:rPr lang="en-US" sz="1100" dirty="0" smtClean="0"/>
-                        <a:t>Infrastructure</a:t>
+                        <a:t>    Infrastructure</a:t>
                       </a:r>
                       <a:endParaRPr lang="en-US" sz="1100" b="0" dirty="0"/>
                     </a:p>
@@ -3622,11 +3616,7 @@
                     <a:p>
                       <a:r>
                         <a:rPr lang="en-US" sz="1100" b="0" dirty="0" smtClean="0"/>
-                        <a:t>        </a:t>
-                      </a:r>
-                      <a:r>
-                        <a:rPr lang="en-US" sz="1100" b="0" dirty="0" smtClean="0"/>
-                        <a:t>Type</a:t>
+                        <a:t>        Type</a:t>
                       </a:r>
                       <a:endParaRPr lang="en-US" sz="1100" b="0" dirty="0"/>
                     </a:p>
@@ -3661,7 +3651,6 @@
                         <a:rPr lang="en-US" sz="1100" b="0" dirty="0" smtClean="0"/>
                         <a:t>Malware C2</a:t>
                       </a:r>
-                      <a:endParaRPr lang="en-US" sz="1100" b="0" dirty="0" smtClean="0"/>
                     </a:p>
                   </a:txBody>
                   <a:tcPr>
@@ -3721,13 +3710,6 @@
                         </a:rPr>
                         <a:t>(None)</a:t>
                       </a:r>
-                      <a:endParaRPr lang="en-US" sz="1100" b="0" dirty="0" smtClean="0">
-                        <a:solidFill>
-                          <a:schemeClr val="bg1">
-                            <a:lumMod val="50000"/>
-                          </a:schemeClr>
-                        </a:solidFill>
-                      </a:endParaRPr>
                     </a:p>
                   </a:txBody>
                   <a:tcPr>
@@ -3924,11 +3906,7 @@
                     <a:p>
                       <a:r>
                         <a:rPr lang="en-US" sz="1100" b="0" dirty="0" smtClean="0"/>
-                        <a:t>            </a:t>
-                      </a:r>
-                      <a:r>
-                        <a:rPr lang="en-US" sz="1100" b="0" dirty="0" smtClean="0"/>
-                        <a:t>Observable</a:t>
+                        <a:t>            Observable</a:t>
                       </a:r>
                       <a:endParaRPr lang="en-US" sz="1100" b="0" dirty="0"/>
                     </a:p>
@@ -4070,11 +4048,7 @@
                     <a:p>
                       <a:r>
                         <a:rPr lang="en-US" sz="1100" b="0" dirty="0" smtClean="0"/>
-                        <a:t>            </a:t>
-                      </a:r>
-                      <a:r>
-                        <a:rPr lang="en-US" sz="1100" b="0" dirty="0" smtClean="0"/>
-                        <a:t>    </a:t>
+                        <a:t>                </a:t>
                       </a:r>
                       <a:r>
                         <a:rPr lang="en-US" sz="1100" b="0" dirty="0" err="1" smtClean="0"/>
@@ -4319,11 +4293,7 @@
                     <a:p>
                       <a:r>
                         <a:rPr lang="en-US" sz="1100" b="0" dirty="0" smtClean="0"/>
-                        <a:t>           </a:t>
-                      </a:r>
-                      <a:r>
-                        <a:rPr lang="en-US" sz="1100" b="0" dirty="0" smtClean="0"/>
-                        <a:t>     </a:t>
+                        <a:t>                </a:t>
                       </a:r>
                       <a:r>
                         <a:rPr lang="en-US" sz="1100" b="0" dirty="0" err="1" smtClean="0"/>
@@ -4539,11 +4509,7 @@
                     <a:p>
                       <a:r>
                         <a:rPr lang="en-US" sz="1100" b="0" dirty="0" smtClean="0"/>
-                        <a:t>           </a:t>
-                      </a:r>
-                      <a:r>
-                        <a:rPr lang="en-US" sz="1100" b="0" dirty="0" smtClean="0"/>
-                        <a:t>     </a:t>
+                        <a:t>                </a:t>
                       </a:r>
                       <a:r>
                         <a:rPr lang="en-US" sz="1100" b="0" dirty="0" err="1" smtClean="0"/>
@@ -4679,7 +4645,7 @@
           <p:nvPr>
             <p:extLst>
               <p:ext uri="{D42A27DB-BD31-4B8C-83A1-F6EECF244321}">
-                <p14:modId xmlns:p14="http://schemas.microsoft.com/office/powerpoint/2010/main" val="2608025130"/>
+                <p14:modId xmlns:p14="http://schemas.microsoft.com/office/powerpoint/2010/main" val="1098572144"/>
               </p:ext>
             </p:extLst>
           </p:nvPr>
@@ -4851,7 +4817,6 @@
                         <a:rPr lang="en-US" sz="1100" b="0" dirty="0" smtClean="0"/>
                         <a:t>example:observable-c8c32b6e-2ea8-51c4-6446-7f5218072f27</a:t>
                       </a:r>
-                      <a:endParaRPr lang="en-US" sz="1100" b="0" dirty="0" smtClean="0"/>
                     </a:p>
                   </a:txBody>
                   <a:tcPr>
@@ -4932,10 +4897,6 @@
                     <a:bodyPr/>
                     <a:lstStyle/>
                     <a:p>
-                      <a:r>
-                        <a:rPr lang="en-US" sz="1100" dirty="0" smtClean="0"/>
-                        <a:t>Malware C2 Channel</a:t>
-                      </a:r>
                       <a:endParaRPr lang="en-US" sz="1100" dirty="0" smtClean="0"/>
                     </a:p>
                   </a:txBody>
@@ -5143,11 +5104,7 @@
                     <a:p>
                       <a:r>
                         <a:rPr lang="en-US" sz="1100" dirty="0" smtClean="0"/>
-                        <a:t>    </a:t>
-                      </a:r>
-                      <a:r>
-                        <a:rPr lang="en-US" sz="1100" dirty="0" smtClean="0"/>
-                        <a:t>    </a:t>
+                        <a:t>        </a:t>
                       </a:r>
                       <a:r>
                         <a:rPr lang="en-US" sz="1100" dirty="0" err="1" smtClean="0"/>
@@ -5186,7 +5143,6 @@
                         <a:rPr lang="en-US" sz="1100" b="0" dirty="0" smtClean="0"/>
                         <a:t>198.51.100.2</a:t>
                       </a:r>
-                      <a:endParaRPr lang="en-US" sz="1100" b="0" dirty="0" smtClean="0"/>
                     </a:p>
                   </a:txBody>
                   <a:tcPr>
@@ -5419,7 +5375,7 @@
           <p:nvPr>
             <p:extLst>
               <p:ext uri="{D42A27DB-BD31-4B8C-83A1-F6EECF244321}">
-                <p14:modId xmlns:p14="http://schemas.microsoft.com/office/powerpoint/2010/main" val="2665062799"/>
+                <p14:modId xmlns:p14="http://schemas.microsoft.com/office/powerpoint/2010/main" val="1508032945"/>
               </p:ext>
             </p:extLst>
           </p:nvPr>
@@ -5608,7 +5564,6 @@
                         <a:rPr lang="en-US" sz="1100" b="0" dirty="0" smtClean="0"/>
                         <a:t>example:observable-b57aa65f-9598-04fb-a9d1-5094c36d5dc4</a:t>
                       </a:r>
-                      <a:endParaRPr lang="en-US" sz="1100" b="0" dirty="0" smtClean="0"/>
                     </a:p>
                   </a:txBody>
                   <a:tcPr>
@@ -5689,10 +5644,6 @@
                     <a:bodyPr/>
                     <a:lstStyle/>
                     <a:p>
-                      <a:r>
-                        <a:rPr lang="en-US" sz="1100" dirty="0" smtClean="0"/>
-                        <a:t>Malware C2 Channel</a:t>
-                      </a:r>
                       <a:endParaRPr lang="en-US" sz="1100" dirty="0" smtClean="0"/>
                     </a:p>
                   </a:txBody>
@@ -5900,11 +5851,7 @@
                     <a:p>
                       <a:r>
                         <a:rPr lang="en-US" sz="1100" dirty="0" smtClean="0"/>
-                        <a:t>    </a:t>
-                      </a:r>
-                      <a:r>
-                        <a:rPr lang="en-US" sz="1100" dirty="0" smtClean="0"/>
-                        <a:t>    </a:t>
+                        <a:t>        </a:t>
                       </a:r>
                       <a:r>
                         <a:rPr lang="en-US" sz="1100" dirty="0" err="1" smtClean="0"/>
@@ -5940,8 +5887,8 @@
                     <a:lstStyle/>
                     <a:p>
                       <a:r>
-                        <a:rPr lang="en-US" sz="1100" b="0" dirty="0" smtClean="0"/>
-                        <a:t>198.51.100.2</a:t>
+                        <a:rPr lang="en-US" sz="1100" dirty="0" smtClean="0"/>
+                        <a:t>198.51.100.17</a:t>
                       </a:r>
                       <a:endParaRPr lang="en-US" sz="1100" b="0" dirty="0" smtClean="0"/>
                     </a:p>
@@ -6176,7 +6123,7 @@
           <p:nvPr>
             <p:extLst>
               <p:ext uri="{D42A27DB-BD31-4B8C-83A1-F6EECF244321}">
-                <p14:modId xmlns:p14="http://schemas.microsoft.com/office/powerpoint/2010/main" val="3633542932"/>
+                <p14:modId xmlns:p14="http://schemas.microsoft.com/office/powerpoint/2010/main" val="3699186815"/>
               </p:ext>
             </p:extLst>
           </p:nvPr>
@@ -6365,7 +6312,6 @@
                         <a:rPr lang="en-US" sz="1100" b="0" dirty="0" smtClean="0"/>
                         <a:t>example:observable-19c16346-0eb4-99e2-00bb-4ec3ed174cac</a:t>
                       </a:r>
-                      <a:endParaRPr lang="en-US" sz="1100" b="0" dirty="0" smtClean="0"/>
                     </a:p>
                   </a:txBody>
                   <a:tcPr>
@@ -6446,10 +6392,6 @@
                     <a:bodyPr/>
                     <a:lstStyle/>
                     <a:p>
-                      <a:r>
-                        <a:rPr lang="en-US" sz="1100" dirty="0" smtClean="0"/>
-                        <a:t>Malware C2 Channel</a:t>
-                      </a:r>
                       <a:endParaRPr lang="en-US" sz="1100" dirty="0" smtClean="0"/>
                     </a:p>
                   </a:txBody>
@@ -6657,11 +6599,7 @@
                     <a:p>
                       <a:r>
                         <a:rPr lang="en-US" sz="1100" dirty="0" smtClean="0"/>
-                        <a:t>    </a:t>
-                      </a:r>
-                      <a:r>
-                        <a:rPr lang="en-US" sz="1100" dirty="0" smtClean="0"/>
-                        <a:t>    </a:t>
+                        <a:t>        </a:t>
                       </a:r>
                       <a:r>
                         <a:rPr lang="en-US" sz="1100" dirty="0" err="1" smtClean="0"/>
@@ -6697,8 +6635,8 @@
                     <a:lstStyle/>
                     <a:p>
                       <a:r>
-                        <a:rPr lang="en-US" sz="1100" b="0" dirty="0" smtClean="0"/>
-                        <a:t>198.51.100.2</a:t>
+                        <a:rPr lang="en-US" sz="1100" dirty="0" smtClean="0"/>
+                        <a:t>203.0.113.19</a:t>
                       </a:r>
                       <a:endParaRPr lang="en-US" sz="1100" b="0" dirty="0" smtClean="0"/>
                     </a:p>

</xml_diff>